<commit_message>
Updated RandomPredictions to use only Test_dataset
</commit_message>
<xml_diff>
--- a/PPT/DIA_Presentation3.pptx
+++ b/PPT/DIA_Presentation3.pptx
@@ -17,18 +17,18 @@
   <p:notesSz cx="6858000" cy="9144000"/>
   <p:embeddedFontLst>
     <p:embeddedFont>
-      <p:font typeface="Homenaje" panose="020B0604020202020204" charset="0"/>
+      <p:font typeface="Homenaje" pitchFamily="2" charset="77"/>
       <p:regular r:id="rId7"/>
     </p:embeddedFont>
     <p:embeddedFont>
-      <p:font typeface="Montserrat" panose="00000500000000000000" pitchFamily="2" charset="0"/>
+      <p:font typeface="Montserrat" pitchFamily="2" charset="77"/>
       <p:regular r:id="rId8"/>
       <p:bold r:id="rId9"/>
       <p:italic r:id="rId10"/>
       <p:boldItalic r:id="rId11"/>
     </p:embeddedFont>
     <p:embeddedFont>
-      <p:font typeface="Raleway" pitchFamily="2" charset="0"/>
+      <p:font typeface="Raleway" pitchFamily="2" charset="77"/>
       <p:regular r:id="rId12"/>
       <p:bold r:id="rId13"/>
       <p:italic r:id="rId14"/>
@@ -270,6 +270,59 @@
     </p:ext>
   </p:extLst>
 </p:presentation>
+</file>
+
+<file path=ppt/revisionInfo.xml><?xml version="1.0" encoding="utf-8"?>
+<p1510:revInfo xmlns:a="http://schemas.openxmlformats.org/drawingml/2006/main" xmlns:r="http://schemas.openxmlformats.org/officeDocument/2006/relationships" xmlns:p1510="http://schemas.microsoft.com/office/powerpoint/2015/10/main">
+  <p1510:revLst>
+    <p1510:client id="{1E808E74-EAC0-0E45-B368-48DE803A2D80}" v="2" dt="2024-04-09T07:43:32.441"/>
+  </p1510:revLst>
+</p1510:revInfo>
+</file>
+
+<file path=ppt/changesInfos/changesInfo1.xml><?xml version="1.0" encoding="utf-8"?>
+<pc:chgInfo xmlns:a="http://schemas.openxmlformats.org/drawingml/2006/main" xmlns:r="http://schemas.openxmlformats.org/officeDocument/2006/relationships" xmlns:ac="http://schemas.microsoft.com/office/drawing/2013/main/command" xmlns:pc="http://schemas.microsoft.com/office/powerpoint/2013/main/command">
+  <pc:docChgLst>
+    <pc:chgData name="MORELLI Davide" userId="08fec0db-9ec0-4570-ad4a-f63294fd17c0" providerId="ADAL" clId="{1E808E74-EAC0-0E45-B368-48DE803A2D80}"/>
+    <pc:docChg chg="undo custSel addSld delSld modSld">
+      <pc:chgData name="MORELLI Davide" userId="08fec0db-9ec0-4570-ad4a-f63294fd17c0" providerId="ADAL" clId="{1E808E74-EAC0-0E45-B368-48DE803A2D80}" dt="2024-04-09T07:44:38.283" v="9" actId="1076"/>
+      <pc:docMkLst>
+        <pc:docMk/>
+      </pc:docMkLst>
+      <pc:sldChg chg="addSp delSp modSp add del mod">
+        <pc:chgData name="MORELLI Davide" userId="08fec0db-9ec0-4570-ad4a-f63294fd17c0" providerId="ADAL" clId="{1E808E74-EAC0-0E45-B368-48DE803A2D80}" dt="2024-04-09T07:44:38.283" v="9" actId="1076"/>
+        <pc:sldMkLst>
+          <pc:docMk/>
+          <pc:sldMk cId="4006422584" sldId="265"/>
+        </pc:sldMkLst>
+        <pc:picChg chg="add del">
+          <ac:chgData name="MORELLI Davide" userId="08fec0db-9ec0-4570-ad4a-f63294fd17c0" providerId="ADAL" clId="{1E808E74-EAC0-0E45-B368-48DE803A2D80}" dt="2024-04-09T07:43:06.197" v="3" actId="478"/>
+          <ac:picMkLst>
+            <pc:docMk/>
+            <pc:sldMk cId="4006422584" sldId="265"/>
+            <ac:picMk id="2" creationId="{1FDC5C56-8061-B4E0-860F-120C86A261E6}"/>
+          </ac:picMkLst>
+        </pc:picChg>
+        <pc:picChg chg="add mod">
+          <ac:chgData name="MORELLI Davide" userId="08fec0db-9ec0-4570-ad4a-f63294fd17c0" providerId="ADAL" clId="{1E808E74-EAC0-0E45-B368-48DE803A2D80}" dt="2024-04-09T07:44:38.283" v="9" actId="1076"/>
+          <ac:picMkLst>
+            <pc:docMk/>
+            <pc:sldMk cId="4006422584" sldId="265"/>
+            <ac:picMk id="3" creationId="{22C385E5-E38A-87AA-79DF-FF729164D821}"/>
+          </ac:picMkLst>
+        </pc:picChg>
+        <pc:picChg chg="del">
+          <ac:chgData name="MORELLI Davide" userId="08fec0db-9ec0-4570-ad4a-f63294fd17c0" providerId="ADAL" clId="{1E808E74-EAC0-0E45-B368-48DE803A2D80}" dt="2024-04-09T07:43:34.400" v="6" actId="478"/>
+          <ac:picMkLst>
+            <pc:docMk/>
+            <pc:sldMk cId="4006422584" sldId="265"/>
+            <ac:picMk id="5" creationId="{3EA34F8A-6675-DDD0-7A6B-D5604155E1B8}"/>
+          </ac:picMkLst>
+        </pc:picChg>
+      </pc:sldChg>
+    </pc:docChg>
+  </pc:docChgLst>
+</pc:chgInfo>
 </file>
 
 <file path=ppt/notesMasters/notesMaster1.xml><?xml version="1.0" encoding="utf-8"?>
@@ -1652,13 +1705,13 @@
   <p:clrMapOvr>
     <a:masterClrMapping/>
   </p:clrMapOvr>
-  <mc:AlternateContent xmlns:mc="http://schemas.openxmlformats.org/markup-compatibility/2006">
-    <mc:Choice xmlns:p159="http://schemas.microsoft.com/office/powerpoint/2015/09/main" Requires="p159">
+  <mc:AlternateContent xmlns:mc="http://schemas.openxmlformats.org/markup-compatibility/2006" xmlns:p159="http://schemas.microsoft.com/office/powerpoint/2015/09/main">
+    <mc:Choice Requires="p159">
       <p:transition spd="slow">
         <p159:morph option="byObject"/>
       </p:transition>
     </mc:Choice>
-    <mc:Fallback>
+    <mc:Fallback xmlns="">
       <p:transition spd="slow">
         <p:fade/>
       </p:transition>
@@ -2590,13 +2643,13 @@
   <p:clrMapOvr>
     <a:masterClrMapping/>
   </p:clrMapOvr>
-  <mc:AlternateContent xmlns:mc="http://schemas.openxmlformats.org/markup-compatibility/2006">
-    <mc:Choice xmlns:p159="http://schemas.microsoft.com/office/powerpoint/2015/09/main" Requires="p159">
+  <mc:AlternateContent xmlns:mc="http://schemas.openxmlformats.org/markup-compatibility/2006" xmlns:p159="http://schemas.microsoft.com/office/powerpoint/2015/09/main">
+    <mc:Choice Requires="p159">
       <p:transition spd="slow">
         <p159:morph option="byObject"/>
       </p:transition>
     </mc:Choice>
-    <mc:Fallback>
+    <mc:Fallback xmlns="">
       <p:transition spd="slow">
         <p:fade/>
       </p:transition>
@@ -2883,13 +2936,13 @@
   <p:clrMapOvr>
     <a:masterClrMapping/>
   </p:clrMapOvr>
-  <mc:AlternateContent xmlns:mc="http://schemas.openxmlformats.org/markup-compatibility/2006">
-    <mc:Choice xmlns:p159="http://schemas.microsoft.com/office/powerpoint/2015/09/main" Requires="p159">
+  <mc:AlternateContent xmlns:mc="http://schemas.openxmlformats.org/markup-compatibility/2006" xmlns:p159="http://schemas.microsoft.com/office/powerpoint/2015/09/main">
+    <mc:Choice Requires="p159">
       <p:transition spd="slow">
         <p159:morph option="byObject"/>
       </p:transition>
     </mc:Choice>
-    <mc:Fallback>
+    <mc:Fallback xmlns="">
       <p:transition spd="slow">
         <p:fade/>
       </p:transition>
@@ -3367,13 +3420,13 @@
   <p:clrMapOvr>
     <a:masterClrMapping/>
   </p:clrMapOvr>
-  <mc:AlternateContent xmlns:mc="http://schemas.openxmlformats.org/markup-compatibility/2006">
-    <mc:Choice xmlns:p159="http://schemas.microsoft.com/office/powerpoint/2015/09/main" Requires="p159">
+  <mc:AlternateContent xmlns:mc="http://schemas.openxmlformats.org/markup-compatibility/2006" xmlns:p159="http://schemas.microsoft.com/office/powerpoint/2015/09/main">
+    <mc:Choice Requires="p159">
       <p:transition spd="slow">
         <p159:morph option="byObject"/>
       </p:transition>
     </mc:Choice>
-    <mc:Fallback>
+    <mc:Fallback xmlns="">
       <p:transition spd="slow">
         <p:fade/>
       </p:transition>
@@ -3623,13 +3676,13 @@
   <p:clrMapOvr>
     <a:masterClrMapping/>
   </p:clrMapOvr>
-  <mc:AlternateContent xmlns:mc="http://schemas.openxmlformats.org/markup-compatibility/2006">
-    <mc:Choice xmlns:p159="http://schemas.microsoft.com/office/powerpoint/2015/09/main" Requires="p159">
+  <mc:AlternateContent xmlns:mc="http://schemas.openxmlformats.org/markup-compatibility/2006" xmlns:p159="http://schemas.microsoft.com/office/powerpoint/2015/09/main">
+    <mc:Choice Requires="p159">
       <p:transition spd="slow">
         <p159:morph option="byObject"/>
       </p:transition>
     </mc:Choice>
-    <mc:Fallback>
+    <mc:Fallback xmlns="">
       <p:transition spd="slow">
         <p:fade/>
       </p:transition>
@@ -3668,13 +3721,13 @@
   <p:clrMapOvr>
     <a:masterClrMapping/>
   </p:clrMapOvr>
-  <mc:AlternateContent xmlns:mc="http://schemas.openxmlformats.org/markup-compatibility/2006">
-    <mc:Choice xmlns:p159="http://schemas.microsoft.com/office/powerpoint/2015/09/main" Requires="p159">
+  <mc:AlternateContent xmlns:mc="http://schemas.openxmlformats.org/markup-compatibility/2006" xmlns:p159="http://schemas.microsoft.com/office/powerpoint/2015/09/main">
+    <mc:Choice Requires="p159">
       <p:transition spd="slow">
         <p159:morph option="byObject"/>
       </p:transition>
     </mc:Choice>
-    <mc:Fallback>
+    <mc:Fallback xmlns="">
       <p:transition spd="slow">
         <p:fade/>
       </p:transition>
@@ -6136,13 +6189,13 @@
   <p:clrMapOvr>
     <a:masterClrMapping/>
   </p:clrMapOvr>
-  <mc:AlternateContent xmlns:mc="http://schemas.openxmlformats.org/markup-compatibility/2006">
-    <mc:Choice xmlns:p159="http://schemas.microsoft.com/office/powerpoint/2015/09/main" Requires="p159">
+  <mc:AlternateContent xmlns:mc="http://schemas.openxmlformats.org/markup-compatibility/2006" xmlns:p159="http://schemas.microsoft.com/office/powerpoint/2015/09/main">
+    <mc:Choice Requires="p159">
       <p:transition spd="slow">
         <p159:morph option="byObject"/>
       </p:transition>
     </mc:Choice>
-    <mc:Fallback>
+    <mc:Fallback xmlns="">
       <p:transition spd="slow">
         <p:fade/>
       </p:transition>
@@ -6295,13 +6348,13 @@
   <p:clrMapOvr>
     <a:masterClrMapping/>
   </p:clrMapOvr>
-  <mc:AlternateContent xmlns:mc="http://schemas.openxmlformats.org/markup-compatibility/2006">
-    <mc:Choice xmlns:p159="http://schemas.microsoft.com/office/powerpoint/2015/09/main" Requires="p159">
+  <mc:AlternateContent xmlns:mc="http://schemas.openxmlformats.org/markup-compatibility/2006" xmlns:p159="http://schemas.microsoft.com/office/powerpoint/2015/09/main">
+    <mc:Choice Requires="p159">
       <p:transition spd="slow">
         <p159:morph option="byObject"/>
       </p:transition>
     </mc:Choice>
-    <mc:Fallback>
+    <mc:Fallback xmlns="">
       <p:transition spd="slow">
         <p:fade/>
       </p:transition>
@@ -6455,13 +6508,13 @@
   <p:clrMapOvr>
     <a:masterClrMapping/>
   </p:clrMapOvr>
-  <mc:AlternateContent xmlns:mc="http://schemas.openxmlformats.org/markup-compatibility/2006">
-    <mc:Choice xmlns:p159="http://schemas.microsoft.com/office/powerpoint/2015/09/main" Requires="p159">
+  <mc:AlternateContent xmlns:mc="http://schemas.openxmlformats.org/markup-compatibility/2006" xmlns:p159="http://schemas.microsoft.com/office/powerpoint/2015/09/main">
+    <mc:Choice Requires="p159">
       <p:transition spd="slow">
         <p159:morph option="byObject"/>
       </p:transition>
     </mc:Choice>
-    <mc:Fallback>
+    <mc:Fallback xmlns="">
       <p:transition spd="slow">
         <p:fade/>
       </p:transition>
@@ -7018,13 +7071,13 @@
     <p:sldLayoutId id="2147483667" r:id="rId8"/>
     <p:sldLayoutId id="2147483668" r:id="rId9"/>
   </p:sldLayoutIdLst>
-  <mc:AlternateContent xmlns:mc="http://schemas.openxmlformats.org/markup-compatibility/2006">
-    <mc:Choice xmlns:p159="http://schemas.microsoft.com/office/powerpoint/2015/09/main" Requires="p159">
+  <mc:AlternateContent xmlns:mc="http://schemas.openxmlformats.org/markup-compatibility/2006" xmlns:p159="http://schemas.microsoft.com/office/powerpoint/2015/09/main">
+    <mc:Choice Requires="p159">
       <p:transition spd="slow">
         <p159:morph option="byObject"/>
       </p:transition>
     </mc:Choice>
-    <mc:Fallback>
+    <mc:Fallback xmlns="">
       <p:transition spd="slow">
         <p:fade/>
       </p:transition>
@@ -8004,13 +8057,13 @@
   <p:clrMapOvr>
     <a:masterClrMapping/>
   </p:clrMapOvr>
-  <mc:AlternateContent xmlns:mc="http://schemas.openxmlformats.org/markup-compatibility/2006">
-    <mc:Choice xmlns:p159="http://schemas.microsoft.com/office/powerpoint/2015/09/main" Requires="p159">
+  <mc:AlternateContent xmlns:mc="http://schemas.openxmlformats.org/markup-compatibility/2006" xmlns:p159="http://schemas.microsoft.com/office/powerpoint/2015/09/main">
+    <mc:Choice Requires="p159">
       <p:transition spd="slow">
         <p159:morph option="byObject"/>
       </p:transition>
     </mc:Choice>
-    <mc:Fallback>
+    <mc:Fallback xmlns="">
       <p:transition spd="slow">
         <p:fade/>
       </p:transition>
@@ -8283,13 +8336,13 @@
   <p:clrMapOvr>
     <a:masterClrMapping/>
   </p:clrMapOvr>
-  <mc:AlternateContent xmlns:mc="http://schemas.openxmlformats.org/markup-compatibility/2006">
-    <mc:Choice xmlns:p159="http://schemas.microsoft.com/office/powerpoint/2015/09/main" Requires="p159">
+  <mc:AlternateContent xmlns:mc="http://schemas.openxmlformats.org/markup-compatibility/2006" xmlns:p159="http://schemas.microsoft.com/office/powerpoint/2015/09/main">
+    <mc:Choice Requires="p159">
       <p:transition spd="slow">
         <p159:morph option="byObject"/>
       </p:transition>
     </mc:Choice>
-    <mc:Fallback>
+    <mc:Fallback xmlns="">
       <p:transition spd="slow">
         <p:fade/>
       </p:transition>
@@ -8480,13 +8533,13 @@
   <p:clrMapOvr>
     <a:masterClrMapping/>
   </p:clrMapOvr>
-  <mc:AlternateContent xmlns:mc="http://schemas.openxmlformats.org/markup-compatibility/2006">
-    <mc:Choice xmlns:p159="http://schemas.microsoft.com/office/powerpoint/2015/09/main" Requires="p159">
+  <mc:AlternateContent xmlns:mc="http://schemas.openxmlformats.org/markup-compatibility/2006" xmlns:p159="http://schemas.microsoft.com/office/powerpoint/2015/09/main">
+    <mc:Choice Requires="p159">
       <p:transition spd="slow">
         <p159:morph option="byObject"/>
       </p:transition>
     </mc:Choice>
-    <mc:Fallback>
+    <mc:Fallback xmlns="">
       <p:transition spd="slow">
         <p:fade/>
       </p:transition>
@@ -8572,10 +8625,10 @@
       </p:sp>
       <p:pic>
         <p:nvPicPr>
-          <p:cNvPr id="5" name="Image 4" descr="Une image contenant texte, capture d’écran, motif, carré&#10;&#10;Description générée automatiquement">
+          <p:cNvPr id="3" name="Immagine 2">
             <a:extLst>
               <a:ext uri="{FF2B5EF4-FFF2-40B4-BE49-F238E27FC236}">
-                <a16:creationId xmlns:a16="http://schemas.microsoft.com/office/drawing/2014/main" id="{3EA34F8A-6675-DDD0-7A6B-D5604155E1B8}"/>
+                <a16:creationId xmlns:a16="http://schemas.microsoft.com/office/drawing/2014/main" id="{22C385E5-E38A-87AA-79DF-FF729164D821}"/>
               </a:ext>
             </a:extLst>
           </p:cNvPr>
@@ -8592,8 +8645,8 @@
         </p:blipFill>
         <p:spPr>
           <a:xfrm>
-            <a:off x="2711576" y="1370340"/>
-            <a:ext cx="3720848" cy="3125063"/>
+            <a:off x="2470150" y="1348018"/>
+            <a:ext cx="4203700" cy="3530600"/>
           </a:xfrm>
           <a:prstGeom prst="rect">
             <a:avLst/>
@@ -8610,13 +8663,13 @@
   <p:clrMapOvr>
     <a:masterClrMapping/>
   </p:clrMapOvr>
-  <mc:AlternateContent xmlns:mc="http://schemas.openxmlformats.org/markup-compatibility/2006">
-    <mc:Choice xmlns:p159="http://schemas.microsoft.com/office/powerpoint/2015/09/main" Requires="p159">
+  <mc:AlternateContent xmlns:mc="http://schemas.openxmlformats.org/markup-compatibility/2006" xmlns:p159="http://schemas.microsoft.com/office/powerpoint/2015/09/main">
+    <mc:Choice Requires="p159">
       <p:transition spd="slow">
         <p159:morph option="byObject"/>
       </p:transition>
     </mc:Choice>
-    <mc:Fallback>
+    <mc:Fallback xmlns="">
       <p:transition spd="slow">
         <p:fade/>
       </p:transition>

</xml_diff>